<commit_message>
Huuuuge update with everything because I'm lazy and don't want to sort this out but need it backed up so I can sleep
</commit_message>
<xml_diff>
--- a/Lectures/1_intro.pptx
+++ b/Lectures/1_intro.pptx
@@ -7,12 +7,11 @@
   <p:sldIdLst>
     <p:sldId id="256" r:id="rId2"/>
     <p:sldId id="257" r:id="rId3"/>
-    <p:sldId id="258" r:id="rId4"/>
-    <p:sldId id="259" r:id="rId5"/>
-    <p:sldId id="260" r:id="rId6"/>
-    <p:sldId id="261" r:id="rId7"/>
-    <p:sldId id="262" r:id="rId8"/>
-    <p:sldId id="263" r:id="rId9"/>
+    <p:sldId id="259" r:id="rId4"/>
+    <p:sldId id="260" r:id="rId5"/>
+    <p:sldId id="261" r:id="rId6"/>
+    <p:sldId id="262" r:id="rId7"/>
+    <p:sldId id="263" r:id="rId8"/>
   </p:sldIdLst>
   <p:sldSz cx="12192000" cy="6858000"/>
   <p:notesSz cx="6858000" cy="9144000"/>
@@ -111,6 +110,11 @@
       </a:defRPr>
     </a:lvl9pPr>
   </p:defaultTextStyle>
+  <p:extLst>
+    <p:ext uri="{EFAFB233-063F-42B5-8137-9DF3F51BA10A}">
+      <p15:sldGuideLst xmlns:p15="http://schemas.microsoft.com/office/powerpoint/2012/main"/>
+    </p:ext>
+  </p:extLst>
 </p:presentation>
 </file>
 
@@ -261,7 +265,7 @@
           <a:p>
             <a:fld id="{93376ADB-D9BF-0C41-BD2F-5F0369FF2A51}" type="datetimeFigureOut">
               <a:rPr lang="en-US" smtClean="0"/>
-              <a:t>8/19/18</a:t>
+              <a:t>1/6/19</a:t>
             </a:fld>
             <a:endParaRPr lang="en-US"/>
           </a:p>
@@ -459,7 +463,7 @@
           <a:p>
             <a:fld id="{93376ADB-D9BF-0C41-BD2F-5F0369FF2A51}" type="datetimeFigureOut">
               <a:rPr lang="en-US" smtClean="0"/>
-              <a:t>8/19/18</a:t>
+              <a:t>1/6/19</a:t>
             </a:fld>
             <a:endParaRPr lang="en-US"/>
           </a:p>
@@ -667,7 +671,7 @@
           <a:p>
             <a:fld id="{93376ADB-D9BF-0C41-BD2F-5F0369FF2A51}" type="datetimeFigureOut">
               <a:rPr lang="en-US" smtClean="0"/>
-              <a:t>8/19/18</a:t>
+              <a:t>1/6/19</a:t>
             </a:fld>
             <a:endParaRPr lang="en-US"/>
           </a:p>
@@ -865,7 +869,7 @@
           <a:p>
             <a:fld id="{93376ADB-D9BF-0C41-BD2F-5F0369FF2A51}" type="datetimeFigureOut">
               <a:rPr lang="en-US" smtClean="0"/>
-              <a:t>8/19/18</a:t>
+              <a:t>1/6/19</a:t>
             </a:fld>
             <a:endParaRPr lang="en-US"/>
           </a:p>
@@ -1140,7 +1144,7 @@
           <a:p>
             <a:fld id="{93376ADB-D9BF-0C41-BD2F-5F0369FF2A51}" type="datetimeFigureOut">
               <a:rPr lang="en-US" smtClean="0"/>
-              <a:t>8/19/18</a:t>
+              <a:t>1/6/19</a:t>
             </a:fld>
             <a:endParaRPr lang="en-US"/>
           </a:p>
@@ -1405,7 +1409,7 @@
           <a:p>
             <a:fld id="{93376ADB-D9BF-0C41-BD2F-5F0369FF2A51}" type="datetimeFigureOut">
               <a:rPr lang="en-US" smtClean="0"/>
-              <a:t>8/19/18</a:t>
+              <a:t>1/6/19</a:t>
             </a:fld>
             <a:endParaRPr lang="en-US"/>
           </a:p>
@@ -1817,7 +1821,7 @@
           <a:p>
             <a:fld id="{93376ADB-D9BF-0C41-BD2F-5F0369FF2A51}" type="datetimeFigureOut">
               <a:rPr lang="en-US" smtClean="0"/>
-              <a:t>8/19/18</a:t>
+              <a:t>1/6/19</a:t>
             </a:fld>
             <a:endParaRPr lang="en-US"/>
           </a:p>
@@ -1958,7 +1962,7 @@
           <a:p>
             <a:fld id="{93376ADB-D9BF-0C41-BD2F-5F0369FF2A51}" type="datetimeFigureOut">
               <a:rPr lang="en-US" smtClean="0"/>
-              <a:t>8/19/18</a:t>
+              <a:t>1/6/19</a:t>
             </a:fld>
             <a:endParaRPr lang="en-US"/>
           </a:p>
@@ -2071,7 +2075,7 @@
           <a:p>
             <a:fld id="{93376ADB-D9BF-0C41-BD2F-5F0369FF2A51}" type="datetimeFigureOut">
               <a:rPr lang="en-US" smtClean="0"/>
-              <a:t>8/19/18</a:t>
+              <a:t>1/6/19</a:t>
             </a:fld>
             <a:endParaRPr lang="en-US"/>
           </a:p>
@@ -2382,7 +2386,7 @@
           <a:p>
             <a:fld id="{93376ADB-D9BF-0C41-BD2F-5F0369FF2A51}" type="datetimeFigureOut">
               <a:rPr lang="en-US" smtClean="0"/>
-              <a:t>8/19/18</a:t>
+              <a:t>1/6/19</a:t>
             </a:fld>
             <a:endParaRPr lang="en-US"/>
           </a:p>
@@ -2670,7 +2674,7 @@
           <a:p>
             <a:fld id="{93376ADB-D9BF-0C41-BD2F-5F0369FF2A51}" type="datetimeFigureOut">
               <a:rPr lang="en-US" smtClean="0"/>
-              <a:t>8/19/18</a:t>
+              <a:t>1/6/19</a:t>
             </a:fld>
             <a:endParaRPr lang="en-US"/>
           </a:p>
@@ -2911,7 +2915,7 @@
           <a:p>
             <a:fld id="{93376ADB-D9BF-0C41-BD2F-5F0369FF2A51}" type="datetimeFigureOut">
               <a:rPr lang="en-US" smtClean="0"/>
-              <a:t>8/19/18</a:t>
+              <a:t>1/6/19</a:t>
             </a:fld>
             <a:endParaRPr lang="en-US"/>
           </a:p>
@@ -3381,7 +3385,7 @@
           <a:p>
             <a:r>
               <a:rPr lang="en-US" dirty="0"/>
-              <a:t>Sports Data Visualization and Analysis</a:t>
+              <a:t>Sports Data Analysis and Visualization</a:t>
             </a:r>
           </a:p>
           <a:p>
@@ -3468,14 +3472,7 @@
           <a:p>
             <a:r>
               <a:rPr lang="en-US" dirty="0"/>
-              <a:t>Who will be in the playoffs </a:t>
-            </a:r>
-            <a:br>
-              <a:rPr lang="en-US" dirty="0"/>
-            </a:br>
-            <a:r>
-              <a:rPr lang="en-US" dirty="0"/>
-              <a:t>in the National League?</a:t>
+              <a:t>Are the Chiefs screwed in the playoffs?</a:t>
             </a:r>
           </a:p>
         </p:txBody>
@@ -3510,40 +3507,43 @@
           <a:chExt cx="0" cy="0"/>
         </a:xfrm>
       </p:grpSpPr>
-      <p:pic>
-        <p:nvPicPr>
-          <p:cNvPr id="3" name="Picture 2">
-            <a:extLst>
-              <a:ext uri="{FF2B5EF4-FFF2-40B4-BE49-F238E27FC236}">
-                <a16:creationId xmlns:a16="http://schemas.microsoft.com/office/drawing/2014/main" id="{0E508C3E-CDB5-AC45-820A-03070F60A36F}"/>
-              </a:ext>
-            </a:extLst>
-          </p:cNvPr>
-          <p:cNvPicPr>
-            <a:picLocks noChangeAspect="1"/>
-          </p:cNvPicPr>
-          <p:nvPr/>
-        </p:nvPicPr>
-        <p:blipFill>
-          <a:blip r:embed="rId2"/>
-          <a:stretch>
-            <a:fillRect/>
-          </a:stretch>
-        </p:blipFill>
+      <p:sp>
+        <p:nvSpPr>
+          <p:cNvPr id="2" name="Title 1">
+            <a:extLst>
+              <a:ext uri="{FF2B5EF4-FFF2-40B4-BE49-F238E27FC236}">
+                <a16:creationId xmlns:a16="http://schemas.microsoft.com/office/drawing/2014/main" id="{4D365286-7BCA-FC47-822F-E2669A4F2ADF}"/>
+              </a:ext>
+            </a:extLst>
+          </p:cNvPr>
+          <p:cNvSpPr>
+            <a:spLocks noGrp="1"/>
+          </p:cNvSpPr>
+          <p:nvPr>
+            <p:ph type="title"/>
+          </p:nvPr>
+        </p:nvSpPr>
         <p:spPr>
           <a:xfrm>
-            <a:off x="524932" y="1032934"/>
-            <a:ext cx="11056471" cy="4826000"/>
+            <a:off x="821267" y="0"/>
+            <a:ext cx="10515600" cy="6858000"/>
           </a:xfrm>
-          <a:prstGeom prst="rect">
-            <a:avLst/>
-          </a:prstGeom>
         </p:spPr>
-      </p:pic>
+        <p:txBody>
+          <a:bodyPr/>
+          <a:lstStyle/>
+          <a:p>
+            <a:r>
+              <a:rPr lang="en-US" dirty="0"/>
+              <a:t>Introductions</a:t>
+            </a:r>
+          </a:p>
+        </p:txBody>
+      </p:sp>
     </p:spTree>
     <p:extLst>
       <p:ext uri="{BB962C8B-B14F-4D97-AF65-F5344CB8AC3E}">
-        <p14:creationId xmlns:p14="http://schemas.microsoft.com/office/powerpoint/2010/main" val="1037042702"/>
+        <p14:creationId xmlns:p14="http://schemas.microsoft.com/office/powerpoint/2010/main" val="1230209992"/>
       </p:ext>
     </p:extLst>
   </p:cSld>
@@ -3575,7 +3575,7 @@
           <p:cNvPr id="2" name="Title 1">
             <a:extLst>
               <a:ext uri="{FF2B5EF4-FFF2-40B4-BE49-F238E27FC236}">
-                <a16:creationId xmlns:a16="http://schemas.microsoft.com/office/drawing/2014/main" id="{4D365286-7BCA-FC47-822F-E2669A4F2ADF}"/>
+                <a16:creationId xmlns:a16="http://schemas.microsoft.com/office/drawing/2014/main" id="{E0D96CB7-2DD7-2A4A-A5ED-C0FA9299986A}"/>
               </a:ext>
             </a:extLst>
           </p:cNvPr>
@@ -3588,8 +3588,8 @@
         </p:nvSpPr>
         <p:spPr>
           <a:xfrm>
-            <a:off x="821267" y="0"/>
-            <a:ext cx="10515600" cy="6858000"/>
+            <a:off x="838200" y="0"/>
+            <a:ext cx="10515600" cy="6857999"/>
           </a:xfrm>
         </p:spPr>
         <p:txBody>
@@ -3598,7 +3598,7 @@
           <a:p>
             <a:r>
               <a:rPr lang="en-US" dirty="0"/>
-              <a:t>Introductions</a:t>
+              <a:t>Syllabus</a:t>
             </a:r>
           </a:p>
         </p:txBody>
@@ -3606,7 +3606,7 @@
     </p:spTree>
     <p:extLst>
       <p:ext uri="{BB962C8B-B14F-4D97-AF65-F5344CB8AC3E}">
-        <p14:creationId xmlns:p14="http://schemas.microsoft.com/office/powerpoint/2010/main" val="1230209992"/>
+        <p14:creationId xmlns:p14="http://schemas.microsoft.com/office/powerpoint/2010/main" val="1396476578"/>
       </p:ext>
     </p:extLst>
   </p:cSld>
@@ -3638,7 +3638,7 @@
           <p:cNvPr id="2" name="Title 1">
             <a:extLst>
               <a:ext uri="{FF2B5EF4-FFF2-40B4-BE49-F238E27FC236}">
-                <a16:creationId xmlns:a16="http://schemas.microsoft.com/office/drawing/2014/main" id="{E0D96CB7-2DD7-2A4A-A5ED-C0FA9299986A}"/>
+                <a16:creationId xmlns:a16="http://schemas.microsoft.com/office/drawing/2014/main" id="{872A976B-36B3-4D40-B99E-755B679E7DE2}"/>
               </a:ext>
             </a:extLst>
           </p:cNvPr>
@@ -3661,7 +3661,7 @@
           <a:p>
             <a:r>
               <a:rPr lang="en-US" dirty="0"/>
-              <a:t>Syllabus</a:t>
+              <a:t>What is this class about?</a:t>
             </a:r>
           </a:p>
         </p:txBody>
@@ -3669,7 +3669,7 @@
     </p:spTree>
     <p:extLst>
       <p:ext uri="{BB962C8B-B14F-4D97-AF65-F5344CB8AC3E}">
-        <p14:creationId xmlns:p14="http://schemas.microsoft.com/office/powerpoint/2010/main" val="1396476578"/>
+        <p14:creationId xmlns:p14="http://schemas.microsoft.com/office/powerpoint/2010/main" val="779542429"/>
       </p:ext>
     </p:extLst>
   </p:cSld>
@@ -3701,69 +3701,6 @@
           <p:cNvPr id="2" name="Title 1">
             <a:extLst>
               <a:ext uri="{FF2B5EF4-FFF2-40B4-BE49-F238E27FC236}">
-                <a16:creationId xmlns:a16="http://schemas.microsoft.com/office/drawing/2014/main" id="{872A976B-36B3-4D40-B99E-755B679E7DE2}"/>
-              </a:ext>
-            </a:extLst>
-          </p:cNvPr>
-          <p:cNvSpPr>
-            <a:spLocks noGrp="1"/>
-          </p:cNvSpPr>
-          <p:nvPr>
-            <p:ph type="title"/>
-          </p:nvPr>
-        </p:nvSpPr>
-        <p:spPr>
-          <a:xfrm>
-            <a:off x="838200" y="0"/>
-            <a:ext cx="10515600" cy="6857999"/>
-          </a:xfrm>
-        </p:spPr>
-        <p:txBody>
-          <a:bodyPr/>
-          <a:lstStyle/>
-          <a:p>
-            <a:r>
-              <a:rPr lang="en-US" dirty="0"/>
-              <a:t>What is this class about?</a:t>
-            </a:r>
-          </a:p>
-        </p:txBody>
-      </p:sp>
-    </p:spTree>
-    <p:extLst>
-      <p:ext uri="{BB962C8B-B14F-4D97-AF65-F5344CB8AC3E}">
-        <p14:creationId xmlns:p14="http://schemas.microsoft.com/office/powerpoint/2010/main" val="779542429"/>
-      </p:ext>
-    </p:extLst>
-  </p:cSld>
-  <p:clrMapOvr>
-    <a:masterClrMapping/>
-  </p:clrMapOvr>
-</p:sld>
-</file>
-
-<file path=ppt/slides/slide7.xml><?xml version="1.0" encoding="utf-8"?>
-<p:sld xmlns:a="http://schemas.openxmlformats.org/drawingml/2006/main" xmlns:r="http://schemas.openxmlformats.org/officeDocument/2006/relationships" xmlns:p="http://schemas.openxmlformats.org/presentationml/2006/main">
-  <p:cSld>
-    <p:spTree>
-      <p:nvGrpSpPr>
-        <p:cNvPr id="1" name=""/>
-        <p:cNvGrpSpPr/>
-        <p:nvPr/>
-      </p:nvGrpSpPr>
-      <p:grpSpPr>
-        <a:xfrm>
-          <a:off x="0" y="0"/>
-          <a:ext cx="0" cy="0"/>
-          <a:chOff x="0" y="0"/>
-          <a:chExt cx="0" cy="0"/>
-        </a:xfrm>
-      </p:grpSpPr>
-      <p:sp>
-        <p:nvSpPr>
-          <p:cNvPr id="2" name="Title 1">
-            <a:extLst>
-              <a:ext uri="{FF2B5EF4-FFF2-40B4-BE49-F238E27FC236}">
                 <a16:creationId xmlns:a16="http://schemas.microsoft.com/office/drawing/2014/main" id="{F5B07E2C-A48E-E245-9924-03740FCEDFB3}"/>
               </a:ext>
             </a:extLst>
@@ -3805,7 +3742,7 @@
 </p:sld>
 </file>
 
-<file path=ppt/slides/slide8.xml><?xml version="1.0" encoding="utf-8"?>
+<file path=ppt/slides/slide7.xml><?xml version="1.0" encoding="utf-8"?>
 <p:sld xmlns:a="http://schemas.openxmlformats.org/drawingml/2006/main" xmlns:r="http://schemas.openxmlformats.org/officeDocument/2006/relationships" xmlns:p="http://schemas.openxmlformats.org/presentationml/2006/main">
   <p:cSld>
     <p:spTree>

</xml_diff>